<commit_message>
Added code to get stat pull between tau and A values
</commit_message>
<xml_diff>
--- a/gain_corrections_omega_a.pptx
+++ b/gain_corrections_omega_a.pptx
@@ -131,6 +131,9 @@
     <p:ext uri="{EFAFB233-063F-42B5-8137-9DF3F51BA10A}">
       <p15:sldGuideLst xmlns:p15="http://schemas.microsoft.com/office/powerpoint/2012/main"/>
     </p:ext>
+    <p:ext uri="{2D200454-40CA-4A62-9FC3-DE9A4176ACB9}">
+      <p15:notesGuideLst xmlns:p15="http://schemas.microsoft.com/office/powerpoint/2012/main"/>
+    </p:ext>
   </p:extLst>
 </p:presentation>
 </file>
@@ -229,7 +232,7 @@
           <a:p>
             <a:fld id="{E18E715B-C4C6-FA44-89E6-29CE8E5147AD}" type="datetimeFigureOut">
               <a:rPr lang="en-US" smtClean="0"/>
-              <a:t>4/30/19</a:t>
+              <a:t>5/20/19</a:t>
             </a:fld>
             <a:endParaRPr lang="en-US"/>
           </a:p>
@@ -406,7 +409,7 @@
           <a:p>
             <a:fld id="{C9BEE1CD-6EDF-5C43-ACE9-942F6C137C3E}" type="datetimeFigureOut">
               <a:rPr lang="en-US" smtClean="0"/>
-              <a:t>4/29/19</a:t>
+              <a:t>5/20/19</a:t>
             </a:fld>
             <a:endParaRPr lang="en-US"/>
           </a:p>

</xml_diff>